<commit_message>
Update 2.7 and 2.8 Documentation Template.pptx
</commit_message>
<xml_diff>
--- a/2.7 and 2.8 Documentation Template.pptx
+++ b/2.7 and 2.8 Documentation Template.pptx
@@ -5,22 +5,23 @@
     <p:sldMasterId id="2147483648" r:id="rId3"/>
   </p:sldMasterIdLst>
   <p:notesMasterIdLst>
-    <p:notesMasterId r:id="rId17"/>
+    <p:notesMasterId r:id="rId18"/>
   </p:notesMasterIdLst>
   <p:sldIdLst>
     <p:sldId id="256" r:id="rId4"/>
     <p:sldId id="258" r:id="rId5"/>
     <p:sldId id="272" r:id="rId6"/>
     <p:sldId id="275" r:id="rId7"/>
-    <p:sldId id="260" r:id="rId8"/>
-    <p:sldId id="268" r:id="rId9"/>
-    <p:sldId id="269" r:id="rId10"/>
-    <p:sldId id="274" r:id="rId11"/>
-    <p:sldId id="273" r:id="rId12"/>
-    <p:sldId id="263" r:id="rId13"/>
-    <p:sldId id="270" r:id="rId14"/>
-    <p:sldId id="261" r:id="rId15"/>
-    <p:sldId id="266" r:id="rId16"/>
+    <p:sldId id="276" r:id="rId8"/>
+    <p:sldId id="277" r:id="rId9"/>
+    <p:sldId id="268" r:id="rId10"/>
+    <p:sldId id="269" r:id="rId11"/>
+    <p:sldId id="274" r:id="rId12"/>
+    <p:sldId id="273" r:id="rId13"/>
+    <p:sldId id="263" r:id="rId14"/>
+    <p:sldId id="270" r:id="rId15"/>
+    <p:sldId id="261" r:id="rId16"/>
+    <p:sldId id="266" r:id="rId17"/>
   </p:sldIdLst>
   <p:sldSz cx="12192000" cy="6858000"/>
   <p:notesSz cx="6858000" cy="9144000"/>
@@ -209,7 +210,7 @@
           <a:p>
             <a:fld id="{F37D28C0-BEB6-42B0-A203-EEE1023219C4}" type="datetimeFigureOut">
               <a:rPr lang="en-NZ" smtClean="0"/>
-              <a:t>1/05/2023</a:t>
+              <a:t>8/05/2023</a:t>
             </a:fld>
             <a:endParaRPr lang="en-NZ"/>
           </a:p>
@@ -628,9 +629,14 @@
             <a:r>
               <a:rPr lang="en-NZ" i="1" dirty="0">
                 <a:latin typeface="Arial" panose="020B0604020202020204" pitchFamily="34" charset="0"/>
+                <a:ea typeface="Arial" panose="020B0604020202020204" pitchFamily="34" charset="0"/>
               </a:rPr>
-              <a:t>Discuss how the information from planning, testing and trialling of components assisted in the development of a high-quality outcome.</a:t>
-            </a:r>
+              <a:t>Your version control evidence should go here.  This could be in the form of screenshots (both of your GitHub repository as well as your local project folder) as evidence of your incremental development.</a:t>
+            </a:r>
+            <a:endParaRPr lang="en-NZ" dirty="0">
+              <a:latin typeface="Arial" panose="020B0604020202020204" pitchFamily="34" charset="0"/>
+              <a:ea typeface="Arial" panose="020B0604020202020204" pitchFamily="34" charset="0"/>
+            </a:endParaRPr>
           </a:p>
           <a:p>
             <a:endParaRPr lang="en-NZ" dirty="0"/>
@@ -655,6 +661,115 @@
             <a:fld id="{D89B2B17-F4B1-4A14-AF99-5A366D45E74A}" type="slidenum">
               <a:rPr lang="en-NZ" smtClean="0"/>
               <a:t>13</a:t>
+            </a:fld>
+            <a:endParaRPr lang="en-NZ"/>
+          </a:p>
+        </p:txBody>
+      </p:sp>
+    </p:spTree>
+    <p:extLst>
+      <p:ext uri="{BB962C8B-B14F-4D97-AF65-F5344CB8AC3E}">
+        <p14:creationId xmlns:p14="http://schemas.microsoft.com/office/powerpoint/2010/main" val="1431557508"/>
+      </p:ext>
+    </p:extLst>
+  </p:cSld>
+  <p:clrMapOvr>
+    <a:masterClrMapping/>
+  </p:clrMapOvr>
+</p:notes>
+</file>
+
+<file path=ppt/notesSlides/notesSlide11.xml><?xml version="1.0" encoding="utf-8"?>
+<p:notes xmlns:a="http://schemas.openxmlformats.org/drawingml/2006/main" xmlns:r="http://schemas.openxmlformats.org/officeDocument/2006/relationships" xmlns:p="http://schemas.openxmlformats.org/presentationml/2006/main">
+  <p:cSld>
+    <p:spTree>
+      <p:nvGrpSpPr>
+        <p:cNvPr id="1" name=""/>
+        <p:cNvGrpSpPr/>
+        <p:nvPr/>
+      </p:nvGrpSpPr>
+      <p:grpSpPr>
+        <a:xfrm>
+          <a:off x="0" y="0"/>
+          <a:ext cx="0" cy="0"/>
+          <a:chOff x="0" y="0"/>
+          <a:chExt cx="0" cy="0"/>
+        </a:xfrm>
+      </p:grpSpPr>
+      <p:sp>
+        <p:nvSpPr>
+          <p:cNvPr id="2" name="Slide Image Placeholder 1"/>
+          <p:cNvSpPr>
+            <a:spLocks noGrp="1" noRot="1" noChangeAspect="1"/>
+          </p:cNvSpPr>
+          <p:nvPr>
+            <p:ph type="sldImg"/>
+          </p:nvPr>
+        </p:nvSpPr>
+        <p:spPr/>
+      </p:sp>
+      <p:sp>
+        <p:nvSpPr>
+          <p:cNvPr id="3" name="Notes Placeholder 2"/>
+          <p:cNvSpPr>
+            <a:spLocks noGrp="1"/>
+          </p:cNvSpPr>
+          <p:nvPr>
+            <p:ph type="body" idx="1"/>
+          </p:nvPr>
+        </p:nvSpPr>
+        <p:spPr/>
+        <p:txBody>
+          <a:bodyPr/>
+          <a:lstStyle/>
+          <a:p>
+            <a:pPr marL="0" marR="0" lvl="0" indent="0" algn="l" defTabSz="914400" rtl="0" eaLnBrk="1" fontAlgn="auto" latinLnBrk="0" hangingPunct="1">
+              <a:lnSpc>
+                <a:spcPct val="100000"/>
+              </a:lnSpc>
+              <a:spcBef>
+                <a:spcPts val="0"/>
+              </a:spcBef>
+              <a:spcAft>
+                <a:spcPts val="0"/>
+              </a:spcAft>
+              <a:buClrTx/>
+              <a:buSzTx/>
+              <a:buFontTx/>
+              <a:buNone/>
+              <a:tabLst/>
+              <a:defRPr/>
+            </a:pPr>
+            <a:r>
+              <a:rPr lang="en-NZ" i="1" dirty="0">
+                <a:latin typeface="Arial" panose="020B0604020202020204" pitchFamily="34" charset="0"/>
+              </a:rPr>
+              <a:t>Discuss how the information from planning, testing and trialling of components assisted in the development of a high-quality outcome.</a:t>
+            </a:r>
+          </a:p>
+          <a:p>
+            <a:endParaRPr lang="en-NZ" dirty="0"/>
+          </a:p>
+        </p:txBody>
+      </p:sp>
+      <p:sp>
+        <p:nvSpPr>
+          <p:cNvPr id="4" name="Slide Number Placeholder 3"/>
+          <p:cNvSpPr>
+            <a:spLocks noGrp="1"/>
+          </p:cNvSpPr>
+          <p:nvPr>
+            <p:ph type="sldNum" sz="quarter" idx="5"/>
+          </p:nvPr>
+        </p:nvSpPr>
+        <p:spPr/>
+        <p:txBody>
+          <a:bodyPr/>
+          <a:lstStyle/>
+          <a:p>
+            <a:fld id="{D89B2B17-F4B1-4A14-AF99-5A366D45E74A}" type="slidenum">
+              <a:rPr lang="en-NZ" smtClean="0"/>
+              <a:t>14</a:t>
             </a:fld>
             <a:endParaRPr lang="en-NZ"/>
           </a:p>
@@ -884,7 +999,7 @@
     </p:spTree>
     <p:extLst>
       <p:ext uri="{BB962C8B-B14F-4D97-AF65-F5344CB8AC3E}">
-        <p14:creationId xmlns:p14="http://schemas.microsoft.com/office/powerpoint/2010/main" val="992946406"/>
+        <p14:creationId xmlns:p14="http://schemas.microsoft.com/office/powerpoint/2010/main" val="1470979764"/>
       </p:ext>
     </p:extLst>
   </p:cSld>
@@ -895,6 +1010,140 @@
 </file>
 
 <file path=ppt/notesSlides/notesSlide4.xml><?xml version="1.0" encoding="utf-8"?>
+<p:notes xmlns:a="http://schemas.openxmlformats.org/drawingml/2006/main" xmlns:r="http://schemas.openxmlformats.org/officeDocument/2006/relationships" xmlns:p="http://schemas.openxmlformats.org/presentationml/2006/main">
+  <p:cSld>
+    <p:spTree>
+      <p:nvGrpSpPr>
+        <p:cNvPr id="1" name=""/>
+        <p:cNvGrpSpPr/>
+        <p:nvPr/>
+      </p:nvGrpSpPr>
+      <p:grpSpPr>
+        <a:xfrm>
+          <a:off x="0" y="0"/>
+          <a:ext cx="0" cy="0"/>
+          <a:chOff x="0" y="0"/>
+          <a:chExt cx="0" cy="0"/>
+        </a:xfrm>
+      </p:grpSpPr>
+      <p:sp>
+        <p:nvSpPr>
+          <p:cNvPr id="2" name="Slide Image Placeholder 1"/>
+          <p:cNvSpPr>
+            <a:spLocks noGrp="1" noRot="1" noChangeAspect="1"/>
+          </p:cNvSpPr>
+          <p:nvPr>
+            <p:ph type="sldImg"/>
+          </p:nvPr>
+        </p:nvSpPr>
+        <p:spPr/>
+      </p:sp>
+      <p:sp>
+        <p:nvSpPr>
+          <p:cNvPr id="3" name="Notes Placeholder 2"/>
+          <p:cNvSpPr>
+            <a:spLocks noGrp="1"/>
+          </p:cNvSpPr>
+          <p:nvPr>
+            <p:ph type="body" idx="1"/>
+          </p:nvPr>
+        </p:nvSpPr>
+        <p:spPr/>
+        <p:txBody>
+          <a:bodyPr/>
+          <a:lstStyle/>
+          <a:p>
+            <a:pPr marL="0" marR="0" lvl="0" indent="0" algn="l" defTabSz="914400" rtl="0" eaLnBrk="1" fontAlgn="auto" latinLnBrk="0" hangingPunct="1">
+              <a:lnSpc>
+                <a:spcPct val="100000"/>
+              </a:lnSpc>
+              <a:spcBef>
+                <a:spcPts val="0"/>
+              </a:spcBef>
+              <a:spcAft>
+                <a:spcPts val="0"/>
+              </a:spcAft>
+              <a:buClrTx/>
+              <a:buSzTx/>
+              <a:buFontTx/>
+              <a:buNone/>
+              <a:tabLst/>
+              <a:defRPr/>
+            </a:pPr>
+            <a:r>
+              <a:rPr lang="en-NZ" i="1" dirty="0"/>
+              <a:t>Paste screenshots of your initial Trello board / task decomposition on this slide.  If you have a long list, you might need to break it up into several slides. </a:t>
+            </a:r>
+            <a:r>
+              <a:rPr lang="en-NZ" dirty="0">
+                <a:latin typeface="Arial" panose="020B0604020202020204" pitchFamily="34" charset="0"/>
+                <a:ea typeface="Arial" panose="020B0604020202020204" pitchFamily="34" charset="0"/>
+              </a:rPr>
+              <a:t> </a:t>
+            </a:r>
+          </a:p>
+          <a:p>
+            <a:pPr marL="0" marR="0" lvl="0" indent="0" algn="l" defTabSz="914400" rtl="0" eaLnBrk="1" fontAlgn="auto" latinLnBrk="0" hangingPunct="1">
+              <a:lnSpc>
+                <a:spcPct val="100000"/>
+              </a:lnSpc>
+              <a:spcBef>
+                <a:spcPts val="0"/>
+              </a:spcBef>
+              <a:spcAft>
+                <a:spcPts val="0"/>
+              </a:spcAft>
+              <a:buClrTx/>
+              <a:buSzTx/>
+              <a:buFontTx/>
+              <a:buNone/>
+              <a:tabLst/>
+              <a:defRPr/>
+            </a:pPr>
+            <a:endParaRPr lang="en-NZ" dirty="0"/>
+          </a:p>
+          <a:p>
+            <a:endParaRPr lang="en-NZ" dirty="0"/>
+          </a:p>
+        </p:txBody>
+      </p:sp>
+      <p:sp>
+        <p:nvSpPr>
+          <p:cNvPr id="4" name="Slide Number Placeholder 3"/>
+          <p:cNvSpPr>
+            <a:spLocks noGrp="1"/>
+          </p:cNvSpPr>
+          <p:nvPr>
+            <p:ph type="sldNum" sz="quarter" idx="5"/>
+          </p:nvPr>
+        </p:nvSpPr>
+        <p:spPr/>
+        <p:txBody>
+          <a:bodyPr/>
+          <a:lstStyle/>
+          <a:p>
+            <a:fld id="{D89B2B17-F4B1-4A14-AF99-5A366D45E74A}" type="slidenum">
+              <a:rPr lang="en-NZ" smtClean="0"/>
+              <a:t>6</a:t>
+            </a:fld>
+            <a:endParaRPr lang="en-NZ"/>
+          </a:p>
+        </p:txBody>
+      </p:sp>
+    </p:spTree>
+    <p:extLst>
+      <p:ext uri="{BB962C8B-B14F-4D97-AF65-F5344CB8AC3E}">
+        <p14:creationId xmlns:p14="http://schemas.microsoft.com/office/powerpoint/2010/main" val="2344397584"/>
+      </p:ext>
+    </p:extLst>
+  </p:cSld>
+  <p:clrMapOvr>
+    <a:masterClrMapping/>
+  </p:clrMapOvr>
+</p:notes>
+</file>
+
+<file path=ppt/notesSlides/notesSlide5.xml><?xml version="1.0" encoding="utf-8"?>
 <p:notes xmlns:a="http://schemas.openxmlformats.org/drawingml/2006/main" xmlns:r="http://schemas.openxmlformats.org/officeDocument/2006/relationships" xmlns:p="http://schemas.openxmlformats.org/presentationml/2006/main" showMasterSp="0" showMasterPhAnim="0">
   <p:cSld>
     <p:spTree>
@@ -998,7 +1247,7 @@
 </p:notes>
 </file>
 
-<file path=ppt/notesSlides/notesSlide5.xml><?xml version="1.0" encoding="utf-8"?>
+<file path=ppt/notesSlides/notesSlide6.xml><?xml version="1.0" encoding="utf-8"?>
 <p:notes xmlns:a="http://schemas.openxmlformats.org/drawingml/2006/main" xmlns:r="http://schemas.openxmlformats.org/officeDocument/2006/relationships" xmlns:p="http://schemas.openxmlformats.org/presentationml/2006/main" showMasterSp="0" showMasterPhAnim="0">
   <p:cSld>
     <p:spTree>
@@ -1125,105 +1374,6 @@
 </p:notes>
 </file>
 
-<file path=ppt/notesSlides/notesSlide6.xml><?xml version="1.0" encoding="utf-8"?>
-<p:notes xmlns:a="http://schemas.openxmlformats.org/drawingml/2006/main" xmlns:r="http://schemas.openxmlformats.org/officeDocument/2006/relationships" xmlns:p="http://schemas.openxmlformats.org/presentationml/2006/main">
-  <p:cSld>
-    <p:spTree>
-      <p:nvGrpSpPr>
-        <p:cNvPr id="1" name=""/>
-        <p:cNvGrpSpPr/>
-        <p:nvPr/>
-      </p:nvGrpSpPr>
-      <p:grpSpPr>
-        <a:xfrm>
-          <a:off x="0" y="0"/>
-          <a:ext cx="0" cy="0"/>
-          <a:chOff x="0" y="0"/>
-          <a:chExt cx="0" cy="0"/>
-        </a:xfrm>
-      </p:grpSpPr>
-      <p:sp>
-        <p:nvSpPr>
-          <p:cNvPr id="2" name="Slide Image Placeholder 1"/>
-          <p:cNvSpPr>
-            <a:spLocks noGrp="1" noRot="1" noChangeAspect="1"/>
-          </p:cNvSpPr>
-          <p:nvPr>
-            <p:ph type="sldImg"/>
-          </p:nvPr>
-        </p:nvSpPr>
-        <p:spPr/>
-      </p:sp>
-      <p:sp>
-        <p:nvSpPr>
-          <p:cNvPr id="3" name="Notes Placeholder 2"/>
-          <p:cNvSpPr>
-            <a:spLocks noGrp="1"/>
-          </p:cNvSpPr>
-          <p:nvPr>
-            <p:ph type="body" idx="1"/>
-          </p:nvPr>
-        </p:nvSpPr>
-        <p:spPr/>
-        <p:txBody>
-          <a:bodyPr/>
-          <a:lstStyle/>
-          <a:p>
-            <a:pPr>
-              <a:lnSpc>
-                <a:spcPct val="115000"/>
-              </a:lnSpc>
-            </a:pPr>
-            <a:r>
-              <a:rPr lang="en-NZ" i="1" dirty="0">
-                <a:latin typeface="Arial" panose="020B0604020202020204" pitchFamily="34" charset="0"/>
-                <a:ea typeface="Arial" panose="020B0604020202020204" pitchFamily="34" charset="0"/>
-              </a:rPr>
-              <a:t>You must show the results of testing. For each component, include a screenshot proving it works.  You can also include notes about each test. </a:t>
-            </a:r>
-            <a:endParaRPr lang="en-NZ" dirty="0">
-              <a:latin typeface="Arial" panose="020B0604020202020204" pitchFamily="34" charset="0"/>
-              <a:ea typeface="Arial" panose="020B0604020202020204" pitchFamily="34" charset="0"/>
-            </a:endParaRPr>
-          </a:p>
-        </p:txBody>
-      </p:sp>
-      <p:sp>
-        <p:nvSpPr>
-          <p:cNvPr id="4" name="Slide Number Placeholder 3"/>
-          <p:cNvSpPr>
-            <a:spLocks noGrp="1"/>
-          </p:cNvSpPr>
-          <p:nvPr>
-            <p:ph type="sldNum" sz="quarter" idx="5"/>
-          </p:nvPr>
-        </p:nvSpPr>
-        <p:spPr/>
-        <p:txBody>
-          <a:bodyPr/>
-          <a:lstStyle/>
-          <a:p>
-            <a:fld id="{D89B2B17-F4B1-4A14-AF99-5A366D45E74A}" type="slidenum">
-              <a:rPr lang="en-NZ" smtClean="0"/>
-              <a:t>8</a:t>
-            </a:fld>
-            <a:endParaRPr lang="en-NZ"/>
-          </a:p>
-        </p:txBody>
-      </p:sp>
-    </p:spTree>
-    <p:extLst>
-      <p:ext uri="{BB962C8B-B14F-4D97-AF65-F5344CB8AC3E}">
-        <p14:creationId xmlns:p14="http://schemas.microsoft.com/office/powerpoint/2010/main" val="3683133660"/>
-      </p:ext>
-    </p:extLst>
-  </p:cSld>
-  <p:clrMapOvr>
-    <a:masterClrMapping/>
-  </p:clrMapOvr>
-</p:notes>
-</file>
-
 <file path=ppt/notesSlides/notesSlide7.xml><?xml version="1.0" encoding="utf-8"?>
 <p:notes xmlns:a="http://schemas.openxmlformats.org/drawingml/2006/main" xmlns:r="http://schemas.openxmlformats.org/officeDocument/2006/relationships" xmlns:p="http://schemas.openxmlformats.org/presentationml/2006/main">
   <p:cSld>
@@ -1268,25 +1418,22 @@
           <a:bodyPr/>
           <a:lstStyle/>
           <a:p>
-            <a:r>
-              <a:rPr lang="en-NZ" i="1" dirty="0"/>
-              <a:t>NOTE: Trialling needs to happen for </a:t>
-            </a:r>
-            <a:r>
-              <a:rPr lang="en-NZ" b="1" i="1" dirty="0"/>
-              <a:t>at least 2 </a:t>
-            </a:r>
-            <a:r>
-              <a:rPr lang="en-NZ" i="1" dirty="0"/>
-              <a:t>of your components but is not necessary for ALL components.</a:t>
-            </a:r>
-          </a:p>
-          <a:p>
-            <a:r>
-              <a:rPr lang="en" i="1" dirty="0"/>
-              <a:t>Trialling is not the same as testing. Trialling is about finding different ways of building the same component. Show evidence of  your trialling  here. Select one of your trials for further development and give reasons for your choice. </a:t>
-            </a:r>
-            <a:endParaRPr lang="en-NZ" dirty="0"/>
+            <a:pPr>
+              <a:lnSpc>
+                <a:spcPct val="115000"/>
+              </a:lnSpc>
+            </a:pPr>
+            <a:r>
+              <a:rPr lang="en-NZ" i="1" dirty="0">
+                <a:latin typeface="Arial" panose="020B0604020202020204" pitchFamily="34" charset="0"/>
+                <a:ea typeface="Arial" panose="020B0604020202020204" pitchFamily="34" charset="0"/>
+              </a:rPr>
+              <a:t>You must show the results of testing. For each component, include a screenshot proving it works.  You can also include notes about each test. </a:t>
+            </a:r>
+            <a:endParaRPr lang="en-NZ" dirty="0">
+              <a:latin typeface="Arial" panose="020B0604020202020204" pitchFamily="34" charset="0"/>
+              <a:ea typeface="Arial" panose="020B0604020202020204" pitchFamily="34" charset="0"/>
+            </a:endParaRPr>
           </a:p>
         </p:txBody>
       </p:sp>
@@ -1316,7 +1463,7 @@
     </p:spTree>
     <p:extLst>
       <p:ext uri="{BB962C8B-B14F-4D97-AF65-F5344CB8AC3E}">
-        <p14:creationId xmlns:p14="http://schemas.microsoft.com/office/powerpoint/2010/main" val="120689959"/>
+        <p14:creationId xmlns:p14="http://schemas.microsoft.com/office/powerpoint/2010/main" val="3683133660"/>
       </p:ext>
     </p:extLst>
   </p:cSld>
@@ -1370,29 +1517,23 @@
           <a:bodyPr/>
           <a:lstStyle/>
           <a:p>
-            <a:pPr marL="0" marR="0" lvl="0" indent="0" algn="l" defTabSz="914400" rtl="0" eaLnBrk="1" fontAlgn="auto" latinLnBrk="0" hangingPunct="1">
-              <a:lnSpc>
-                <a:spcPct val="100000"/>
-              </a:lnSpc>
-              <a:spcBef>
-                <a:spcPts val="0"/>
-              </a:spcBef>
-              <a:spcAft>
-                <a:spcPts val="0"/>
-              </a:spcAft>
-              <a:buClrTx/>
-              <a:buSzTx/>
-              <a:buFontTx/>
-              <a:buNone/>
-              <a:tabLst/>
-              <a:defRPr/>
-            </a:pPr>
-            <a:r>
-              <a:rPr lang="en-NZ" i="1" dirty="0">
-                <a:latin typeface="Arial" panose="020B0604020202020204" pitchFamily="34" charset="0"/>
-                <a:ea typeface="Arial" panose="020B0604020202020204" pitchFamily="34" charset="0"/>
-              </a:rPr>
-              <a:t>Show testing for your assembled outcome below.  This should include a test plan followed by screenshot proof.  </a:t>
+            <a:r>
+              <a:rPr lang="en-NZ" i="1" dirty="0"/>
+              <a:t>NOTE: Trialling needs to happen for </a:t>
+            </a:r>
+            <a:r>
+              <a:rPr lang="en-NZ" b="1" i="1" dirty="0"/>
+              <a:t>at least 2 </a:t>
+            </a:r>
+            <a:r>
+              <a:rPr lang="en-NZ" i="1" dirty="0"/>
+              <a:t>of your components but is not necessary for ALL components.</a:t>
+            </a:r>
+          </a:p>
+          <a:p>
+            <a:r>
+              <a:rPr lang="en" i="1" dirty="0"/>
+              <a:t>Trialling is not the same as testing. Trialling is about finding different ways of building the same component. Show evidence of  your trialling  here. Select one of your trials for further development and give reasons for your choice. </a:t>
             </a:r>
             <a:endParaRPr lang="en-NZ" dirty="0"/>
           </a:p>
@@ -1424,7 +1565,7 @@
     </p:spTree>
     <p:extLst>
       <p:ext uri="{BB962C8B-B14F-4D97-AF65-F5344CB8AC3E}">
-        <p14:creationId xmlns:p14="http://schemas.microsoft.com/office/powerpoint/2010/main" val="234755665"/>
+        <p14:creationId xmlns:p14="http://schemas.microsoft.com/office/powerpoint/2010/main" val="120689959"/>
       </p:ext>
     </p:extLst>
   </p:cSld>
@@ -1500,14 +1641,8 @@
                 <a:latin typeface="Arial" panose="020B0604020202020204" pitchFamily="34" charset="0"/>
                 <a:ea typeface="Arial" panose="020B0604020202020204" pitchFamily="34" charset="0"/>
               </a:rPr>
-              <a:t>Your version control evidence should go here.  This could be in the form of screenshots (both of your GitHub repository as well as your local project folder) as evidence of your incremental development.</a:t>
-            </a:r>
-            <a:endParaRPr lang="en-NZ" dirty="0">
-              <a:latin typeface="Arial" panose="020B0604020202020204" pitchFamily="34" charset="0"/>
-              <a:ea typeface="Arial" panose="020B0604020202020204" pitchFamily="34" charset="0"/>
-            </a:endParaRPr>
-          </a:p>
-          <a:p>
+              <a:t>Show testing for your assembled outcome below.  This should include a test plan followed by screenshot proof.  </a:t>
+            </a:r>
             <a:endParaRPr lang="en-NZ" dirty="0"/>
           </a:p>
         </p:txBody>
@@ -1529,7 +1664,7 @@
           <a:p>
             <a:fld id="{D89B2B17-F4B1-4A14-AF99-5A366D45E74A}" type="slidenum">
               <a:rPr lang="en-NZ" smtClean="0"/>
-              <a:t>12</a:t>
+              <a:t>11</a:t>
             </a:fld>
             <a:endParaRPr lang="en-NZ"/>
           </a:p>
@@ -1538,7 +1673,7 @@
     </p:spTree>
     <p:extLst>
       <p:ext uri="{BB962C8B-B14F-4D97-AF65-F5344CB8AC3E}">
-        <p14:creationId xmlns:p14="http://schemas.microsoft.com/office/powerpoint/2010/main" val="1431557508"/>
+        <p14:creationId xmlns:p14="http://schemas.microsoft.com/office/powerpoint/2010/main" val="234755665"/>
       </p:ext>
     </p:extLst>
   </p:cSld>
@@ -1697,7 +1832,7 @@
           <a:p>
             <a:fld id="{9C4A4F43-1C06-40E6-8F87-8B286982E50E}" type="datetimeFigureOut">
               <a:rPr lang="en-NZ" smtClean="0"/>
-              <a:t>1/05/2023</a:t>
+              <a:t>8/05/2023</a:t>
             </a:fld>
             <a:endParaRPr lang="en-NZ" dirty="0"/>
           </a:p>
@@ -1897,7 +2032,7 @@
           <a:p>
             <a:fld id="{9C4A4F43-1C06-40E6-8F87-8B286982E50E}" type="datetimeFigureOut">
               <a:rPr lang="en-NZ" smtClean="0"/>
-              <a:t>1/05/2023</a:t>
+              <a:t>8/05/2023</a:t>
             </a:fld>
             <a:endParaRPr lang="en-NZ" dirty="0"/>
           </a:p>
@@ -2107,7 +2242,7 @@
           <a:p>
             <a:fld id="{9C4A4F43-1C06-40E6-8F87-8B286982E50E}" type="datetimeFigureOut">
               <a:rPr lang="en-NZ" smtClean="0"/>
-              <a:t>1/05/2023</a:t>
+              <a:t>8/05/2023</a:t>
             </a:fld>
             <a:endParaRPr lang="en-NZ" dirty="0"/>
           </a:p>
@@ -2666,7 +2801,7 @@
           <a:p>
             <a:fld id="{9C4A4F43-1C06-40E6-8F87-8B286982E50E}" type="datetimeFigureOut">
               <a:rPr lang="en-NZ" smtClean="0"/>
-              <a:t>1/05/2023</a:t>
+              <a:t>8/05/2023</a:t>
             </a:fld>
             <a:endParaRPr lang="en-NZ" dirty="0"/>
           </a:p>
@@ -2942,7 +3077,7 @@
           <a:p>
             <a:fld id="{9C4A4F43-1C06-40E6-8F87-8B286982E50E}" type="datetimeFigureOut">
               <a:rPr lang="en-NZ" smtClean="0"/>
-              <a:t>1/05/2023</a:t>
+              <a:t>8/05/2023</a:t>
             </a:fld>
             <a:endParaRPr lang="en-NZ" dirty="0"/>
           </a:p>
@@ -3210,7 +3345,7 @@
           <a:p>
             <a:fld id="{9C4A4F43-1C06-40E6-8F87-8B286982E50E}" type="datetimeFigureOut">
               <a:rPr lang="en-NZ" smtClean="0"/>
-              <a:t>1/05/2023</a:t>
+              <a:t>8/05/2023</a:t>
             </a:fld>
             <a:endParaRPr lang="en-NZ" dirty="0"/>
           </a:p>
@@ -3625,7 +3760,7 @@
           <a:p>
             <a:fld id="{9C4A4F43-1C06-40E6-8F87-8B286982E50E}" type="datetimeFigureOut">
               <a:rPr lang="en-NZ" smtClean="0"/>
-              <a:t>1/05/2023</a:t>
+              <a:t>8/05/2023</a:t>
             </a:fld>
             <a:endParaRPr lang="en-NZ" dirty="0"/>
           </a:p>
@@ -3767,7 +3902,7 @@
           <a:p>
             <a:fld id="{9C4A4F43-1C06-40E6-8F87-8B286982E50E}" type="datetimeFigureOut">
               <a:rPr lang="en-NZ" smtClean="0"/>
-              <a:t>1/05/2023</a:t>
+              <a:t>8/05/2023</a:t>
             </a:fld>
             <a:endParaRPr lang="en-NZ" dirty="0"/>
           </a:p>
@@ -3880,7 +4015,7 @@
           <a:p>
             <a:fld id="{9C4A4F43-1C06-40E6-8F87-8B286982E50E}" type="datetimeFigureOut">
               <a:rPr lang="en-NZ" smtClean="0"/>
-              <a:t>1/05/2023</a:t>
+              <a:t>8/05/2023</a:t>
             </a:fld>
             <a:endParaRPr lang="en-NZ" dirty="0"/>
           </a:p>
@@ -4193,7 +4328,7 @@
           <a:p>
             <a:fld id="{9C4A4F43-1C06-40E6-8F87-8B286982E50E}" type="datetimeFigureOut">
               <a:rPr lang="en-NZ" smtClean="0"/>
-              <a:t>1/05/2023</a:t>
+              <a:t>8/05/2023</a:t>
             </a:fld>
             <a:endParaRPr lang="en-NZ" dirty="0"/>
           </a:p>
@@ -4482,7 +4617,7 @@
           <a:p>
             <a:fld id="{9C4A4F43-1C06-40E6-8F87-8B286982E50E}" type="datetimeFigureOut">
               <a:rPr lang="en-NZ" smtClean="0"/>
-              <a:t>1/05/2023</a:t>
+              <a:t>8/05/2023</a:t>
             </a:fld>
             <a:endParaRPr lang="en-NZ" dirty="0"/>
           </a:p>
@@ -4725,7 +4860,7 @@
           <a:p>
             <a:fld id="{9C4A4F43-1C06-40E6-8F87-8B286982E50E}" type="datetimeFigureOut">
               <a:rPr lang="en-NZ" smtClean="0"/>
-              <a:t>1/05/2023</a:t>
+              <a:t>8/05/2023</a:t>
             </a:fld>
             <a:endParaRPr lang="en-NZ" dirty="0"/>
           </a:p>
@@ -5246,6 +5381,121 @@
           <p:cNvPr id="2" name="Title 1">
             <a:extLst>
               <a:ext uri="{FF2B5EF4-FFF2-40B4-BE49-F238E27FC236}">
+                <a16:creationId xmlns:a16="http://schemas.microsoft.com/office/drawing/2014/main" id="{1CC5D32F-7C18-4D00-8D54-2FB046F0A206}"/>
+              </a:ext>
+            </a:extLst>
+          </p:cNvPr>
+          <p:cNvSpPr>
+            <a:spLocks noGrp="1"/>
+          </p:cNvSpPr>
+          <p:nvPr>
+            <p:ph type="title"/>
+          </p:nvPr>
+        </p:nvSpPr>
+        <p:spPr>
+          <a:xfrm>
+            <a:off x="749300" y="223520"/>
+            <a:ext cx="10515600" cy="806768"/>
+          </a:xfrm>
+        </p:spPr>
+        <p:txBody>
+          <a:bodyPr>
+            <a:normAutofit/>
+          </a:bodyPr>
+          <a:lstStyle/>
+          <a:p>
+            <a:r>
+              <a:rPr lang="en-NZ" sz="4000" dirty="0"/>
+              <a:t>[Component name]: Trialling </a:t>
+            </a:r>
+          </a:p>
+        </p:txBody>
+      </p:sp>
+      <p:sp>
+        <p:nvSpPr>
+          <p:cNvPr id="4" name="TextBox 3">
+            <a:extLst>
+              <a:ext uri="{FF2B5EF4-FFF2-40B4-BE49-F238E27FC236}">
+                <a16:creationId xmlns:a16="http://schemas.microsoft.com/office/drawing/2014/main" id="{8CD07A82-A944-4A9B-9A52-515DAC30878A}"/>
+              </a:ext>
+            </a:extLst>
+          </p:cNvPr>
+          <p:cNvSpPr txBox="1"/>
+          <p:nvPr/>
+        </p:nvSpPr>
+        <p:spPr>
+          <a:xfrm>
+            <a:off x="660400" y="1030288"/>
+            <a:ext cx="10693400" cy="923330"/>
+          </a:xfrm>
+          <a:prstGeom prst="rect">
+            <a:avLst/>
+          </a:prstGeom>
+          <a:noFill/>
+        </p:spPr>
+        <p:txBody>
+          <a:bodyPr wrap="square">
+            <a:spAutoFit/>
+          </a:bodyPr>
+          <a:lstStyle/>
+          <a:p>
+            <a:r>
+              <a:rPr lang="en-NZ" i="1" dirty="0"/>
+              <a:t>NOTE: Trialling needs to happen for </a:t>
+            </a:r>
+            <a:r>
+              <a:rPr lang="en-NZ" b="1" i="1" dirty="0"/>
+              <a:t>at least 2 </a:t>
+            </a:r>
+            <a:r>
+              <a:rPr lang="en-NZ" i="1" dirty="0"/>
+              <a:t>of your components but is not necessary for ALL components.</a:t>
+            </a:r>
+          </a:p>
+          <a:p>
+            <a:r>
+              <a:rPr lang="en" i="1" dirty="0"/>
+              <a:t>Trialling is not the same as testing. Trialling is about finding different ways of building the same component. Show evidence of  your trialling  here. Select one of your trials for further development and give reasons for your choice. </a:t>
+            </a:r>
+            <a:endParaRPr lang="en-NZ" dirty="0"/>
+          </a:p>
+        </p:txBody>
+      </p:sp>
+    </p:spTree>
+    <p:extLst>
+      <p:ext uri="{BB962C8B-B14F-4D97-AF65-F5344CB8AC3E}">
+        <p14:creationId xmlns:p14="http://schemas.microsoft.com/office/powerpoint/2010/main" val="270828811"/>
+      </p:ext>
+    </p:extLst>
+  </p:cSld>
+  <p:clrMapOvr>
+    <a:masterClrMapping/>
+  </p:clrMapOvr>
+</p:sld>
+</file>
+
+<file path=ppt/slides/slide11.xml><?xml version="1.0" encoding="utf-8"?>
+<p:sld xmlns:a="http://schemas.openxmlformats.org/drawingml/2006/main" xmlns:r="http://schemas.openxmlformats.org/officeDocument/2006/relationships" xmlns:p="http://schemas.openxmlformats.org/presentationml/2006/main">
+  <p:cSld>
+    <p:spTree>
+      <p:nvGrpSpPr>
+        <p:cNvPr id="1" name=""/>
+        <p:cNvGrpSpPr/>
+        <p:nvPr/>
+      </p:nvGrpSpPr>
+      <p:grpSpPr>
+        <a:xfrm>
+          <a:off x="0" y="0"/>
+          <a:ext cx="0" cy="0"/>
+          <a:chOff x="0" y="0"/>
+          <a:chExt cx="0" cy="0"/>
+        </a:xfrm>
+      </p:grpSpPr>
+      <p:sp>
+        <p:nvSpPr>
+          <p:cNvPr id="2" name="Title 1">
+            <a:extLst>
+              <a:ext uri="{FF2B5EF4-FFF2-40B4-BE49-F238E27FC236}">
                 <a16:creationId xmlns:a16="http://schemas.microsoft.com/office/drawing/2014/main" id="{183CAE4A-E189-4CAA-B3F5-7E97BC5188E3}"/>
               </a:ext>
             </a:extLst>
@@ -5338,7 +5588,7 @@
 </p:sld>
 </file>
 
-<file path=ppt/slides/slide11.xml><?xml version="1.0" encoding="utf-8"?>
+<file path=ppt/slides/slide12.xml><?xml version="1.0" encoding="utf-8"?>
 <p:sld xmlns:a="http://schemas.openxmlformats.org/drawingml/2006/main" xmlns:r="http://schemas.openxmlformats.org/officeDocument/2006/relationships" xmlns:p="http://schemas.openxmlformats.org/presentationml/2006/main">
   <p:cSld>
     <p:spTree>
@@ -5610,7 +5860,7 @@
 </p:sld>
 </file>
 
-<file path=ppt/slides/slide12.xml><?xml version="1.0" encoding="utf-8"?>
+<file path=ppt/slides/slide13.xml><?xml version="1.0" encoding="utf-8"?>
 <p:sld xmlns:a="http://schemas.openxmlformats.org/drawingml/2006/main" xmlns:r="http://schemas.openxmlformats.org/officeDocument/2006/relationships" xmlns:p="http://schemas.openxmlformats.org/presentationml/2006/main">
   <p:cSld>
     <p:spTree>
@@ -5724,7 +5974,7 @@
 </p:sld>
 </file>
 
-<file path=ppt/slides/slide13.xml><?xml version="1.0" encoding="utf-8"?>
+<file path=ppt/slides/slide14.xml><?xml version="1.0" encoding="utf-8"?>
 <p:sld xmlns:a="http://schemas.openxmlformats.org/drawingml/2006/main" xmlns:r="http://schemas.openxmlformats.org/officeDocument/2006/relationships" xmlns:p="http://schemas.openxmlformats.org/presentationml/2006/main">
   <p:cSld>
     <p:spTree>
@@ -7499,7 +7749,7 @@
         </p:nvSpPr>
         <p:spPr>
           <a:xfrm>
-            <a:off x="838200" y="365125"/>
+            <a:off x="838200" y="249378"/>
             <a:ext cx="10515600" cy="600075"/>
           </a:xfrm>
         </p:spPr>
@@ -7530,7 +7780,7 @@
         </p:nvSpPr>
         <p:spPr>
           <a:xfrm>
-            <a:off x="838200" y="965200"/>
+            <a:off x="838200" y="853953"/>
             <a:ext cx="9999846" cy="708912"/>
           </a:xfrm>
           <a:prstGeom prst="rect">
@@ -7562,10 +7812,45 @@
           </a:p>
         </p:txBody>
       </p:sp>
+      <p:pic>
+        <p:nvPicPr>
+          <p:cNvPr id="10" name="Picture 9">
+            <a:extLst>
+              <a:ext uri="{FF2B5EF4-FFF2-40B4-BE49-F238E27FC236}">
+                <a16:creationId xmlns:a16="http://schemas.microsoft.com/office/drawing/2014/main" id="{40E60D61-F92D-AC5C-898F-38E98EBE5B38}"/>
+              </a:ext>
+            </a:extLst>
+          </p:cNvPr>
+          <p:cNvPicPr>
+            <a:picLocks noChangeAspect="1"/>
+          </p:cNvPicPr>
+          <p:nvPr/>
+        </p:nvPicPr>
+        <p:blipFill>
+          <a:blip r:embed="rId3"/>
+          <a:stretch>
+            <a:fillRect/>
+          </a:stretch>
+        </p:blipFill>
+        <p:spPr>
+          <a:xfrm>
+            <a:off x="838200" y="1674111"/>
+            <a:ext cx="9017290" cy="4818763"/>
+          </a:xfrm>
+          <a:prstGeom prst="rect">
+            <a:avLst/>
+          </a:prstGeom>
+          <a:ln w="38100">
+            <a:solidFill>
+              <a:schemeClr val="tx1"/>
+            </a:solidFill>
+          </a:ln>
+        </p:spPr>
+      </p:pic>
     </p:spTree>
     <p:extLst>
       <p:ext uri="{BB962C8B-B14F-4D97-AF65-F5344CB8AC3E}">
-        <p14:creationId xmlns:p14="http://schemas.microsoft.com/office/powerpoint/2010/main" val="3760331451"/>
+        <p14:creationId xmlns:p14="http://schemas.microsoft.com/office/powerpoint/2010/main" val="3781960314"/>
       </p:ext>
     </p:extLst>
   </p:cSld>
@@ -7576,6 +7861,160 @@
 </file>
 
 <file path=ppt/slides/slide6.xml><?xml version="1.0" encoding="utf-8"?>
+<p:sld xmlns:a="http://schemas.openxmlformats.org/drawingml/2006/main" xmlns:r="http://schemas.openxmlformats.org/officeDocument/2006/relationships" xmlns:p="http://schemas.openxmlformats.org/presentationml/2006/main">
+  <p:cSld>
+    <p:spTree>
+      <p:nvGrpSpPr>
+        <p:cNvPr id="1" name=""/>
+        <p:cNvGrpSpPr/>
+        <p:nvPr/>
+      </p:nvGrpSpPr>
+      <p:grpSpPr>
+        <a:xfrm>
+          <a:off x="0" y="0"/>
+          <a:ext cx="0" cy="0"/>
+          <a:chOff x="0" y="0"/>
+          <a:chExt cx="0" cy="0"/>
+        </a:xfrm>
+      </p:grpSpPr>
+      <p:sp>
+        <p:nvSpPr>
+          <p:cNvPr id="2" name="Title 1">
+            <a:extLst>
+              <a:ext uri="{FF2B5EF4-FFF2-40B4-BE49-F238E27FC236}">
+                <a16:creationId xmlns:a16="http://schemas.microsoft.com/office/drawing/2014/main" id="{321F8E66-F9B8-4062-8E8D-D5ADB11625DA}"/>
+              </a:ext>
+            </a:extLst>
+          </p:cNvPr>
+          <p:cNvSpPr>
+            <a:spLocks noGrp="1"/>
+          </p:cNvSpPr>
+          <p:nvPr>
+            <p:ph type="title"/>
+          </p:nvPr>
+        </p:nvSpPr>
+        <p:spPr>
+          <a:xfrm>
+            <a:off x="838200" y="514799"/>
+            <a:ext cx="10515600" cy="600075"/>
+          </a:xfrm>
+        </p:spPr>
+        <p:txBody>
+          <a:bodyPr>
+            <a:normAutofit fontScale="90000"/>
+          </a:bodyPr>
+          <a:lstStyle/>
+          <a:p>
+            <a:r>
+              <a:rPr lang="en-NZ" sz="4000" dirty="0"/>
+              <a:t>Decomposition:</a:t>
+            </a:r>
+          </a:p>
+        </p:txBody>
+      </p:sp>
+      <p:sp>
+        <p:nvSpPr>
+          <p:cNvPr id="4" name="Rectangle 3">
+            <a:extLst>
+              <a:ext uri="{FF2B5EF4-FFF2-40B4-BE49-F238E27FC236}">
+                <a16:creationId xmlns:a16="http://schemas.microsoft.com/office/drawing/2014/main" id="{937BF58F-E358-4625-919F-7C3D6EEBA8FB}"/>
+              </a:ext>
+            </a:extLst>
+          </p:cNvPr>
+          <p:cNvSpPr/>
+          <p:nvPr/>
+        </p:nvSpPr>
+        <p:spPr>
+          <a:xfrm>
+            <a:off x="838200" y="1114874"/>
+            <a:ext cx="9999846" cy="708912"/>
+          </a:xfrm>
+          <a:prstGeom prst="rect">
+            <a:avLst/>
+          </a:prstGeom>
+        </p:spPr>
+        <p:txBody>
+          <a:bodyPr wrap="square">
+            <a:spAutoFit/>
+          </a:bodyPr>
+          <a:lstStyle/>
+          <a:p>
+            <a:pPr>
+              <a:lnSpc>
+                <a:spcPct val="115000"/>
+              </a:lnSpc>
+            </a:pPr>
+            <a:r>
+              <a:rPr lang="en-NZ" i="1" dirty="0"/>
+              <a:t>Paste screenshots of your initial Trello board / task decomposition on this slide.  If you have a long list, you might need to break it up into several slides. </a:t>
+            </a:r>
+            <a:r>
+              <a:rPr lang="en-NZ" dirty="0">
+                <a:latin typeface="Arial" panose="020B0604020202020204" pitchFamily="34" charset="0"/>
+                <a:ea typeface="Arial" panose="020B0604020202020204" pitchFamily="34" charset="0"/>
+              </a:rPr>
+              <a:t> </a:t>
+            </a:r>
+          </a:p>
+        </p:txBody>
+      </p:sp>
+      <p:pic>
+        <p:nvPicPr>
+          <p:cNvPr id="7" name="Picture 6">
+            <a:extLst>
+              <a:ext uri="{FF2B5EF4-FFF2-40B4-BE49-F238E27FC236}">
+                <a16:creationId xmlns:a16="http://schemas.microsoft.com/office/drawing/2014/main" id="{89B66FAB-B5C1-9ABC-B4D7-93E06B9D49A0}"/>
+              </a:ext>
+            </a:extLst>
+          </p:cNvPr>
+          <p:cNvPicPr>
+            <a:picLocks noChangeAspect="1"/>
+          </p:cNvPicPr>
+          <p:nvPr/>
+        </p:nvPicPr>
+        <p:blipFill>
+          <a:blip r:embed="rId3"/>
+          <a:stretch>
+            <a:fillRect/>
+          </a:stretch>
+        </p:blipFill>
+        <p:spPr>
+          <a:xfrm>
+            <a:off x="838200" y="2010757"/>
+            <a:ext cx="10782398" cy="3882043"/>
+          </a:xfrm>
+          <a:prstGeom prst="rect">
+            <a:avLst/>
+          </a:prstGeom>
+          <a:ln w="38100" cap="sq">
+            <a:solidFill>
+              <a:srgbClr val="000000"/>
+            </a:solidFill>
+            <a:miter lim="800000"/>
+          </a:ln>
+          <a:effectLst>
+            <a:outerShdw blurRad="57150" dist="50800" dir="2700000" algn="tl" rotWithShape="0">
+              <a:srgbClr val="000000">
+                <a:alpha val="40000"/>
+              </a:srgbClr>
+            </a:outerShdw>
+          </a:effectLst>
+        </p:spPr>
+      </p:pic>
+    </p:spTree>
+    <p:extLst>
+      <p:ext uri="{BB962C8B-B14F-4D97-AF65-F5344CB8AC3E}">
+        <p14:creationId xmlns:p14="http://schemas.microsoft.com/office/powerpoint/2010/main" val="1715090620"/>
+      </p:ext>
+    </p:extLst>
+  </p:cSld>
+  <p:clrMapOvr>
+    <a:masterClrMapping/>
+  </p:clrMapOvr>
+</p:sld>
+</file>
+
+<file path=ppt/slides/slide7.xml><?xml version="1.0" encoding="utf-8"?>
 <p:sld xmlns:a="http://schemas.openxmlformats.org/drawingml/2006/main" xmlns:r="http://schemas.openxmlformats.org/officeDocument/2006/relationships" xmlns:p="http://schemas.openxmlformats.org/presentationml/2006/main">
   <p:cSld>
     <p:spTree>
@@ -7633,7 +8072,7 @@
 </p:sld>
 </file>
 
-<file path=ppt/slides/slide7.xml><?xml version="1.0" encoding="utf-8"?>
+<file path=ppt/slides/slide8.xml><?xml version="1.0" encoding="utf-8"?>
 <p:sld xmlns:a="http://schemas.openxmlformats.org/drawingml/2006/main" xmlns:r="http://schemas.openxmlformats.org/officeDocument/2006/relationships" xmlns:p="http://schemas.openxmlformats.org/presentationml/2006/main">
   <p:cSld>
     <p:spTree>
@@ -7890,106 +8329,6 @@
 </p:sld>
 </file>
 
-<file path=ppt/slides/slide8.xml><?xml version="1.0" encoding="utf-8"?>
-<p:sld xmlns:a="http://schemas.openxmlformats.org/drawingml/2006/main" xmlns:r="http://schemas.openxmlformats.org/officeDocument/2006/relationships" xmlns:p="http://schemas.openxmlformats.org/presentationml/2006/main">
-  <p:cSld>
-    <p:spTree>
-      <p:nvGrpSpPr>
-        <p:cNvPr id="1" name=""/>
-        <p:cNvGrpSpPr/>
-        <p:nvPr/>
-      </p:nvGrpSpPr>
-      <p:grpSpPr>
-        <a:xfrm>
-          <a:off x="0" y="0"/>
-          <a:ext cx="0" cy="0"/>
-          <a:chOff x="0" y="0"/>
-          <a:chExt cx="0" cy="0"/>
-        </a:xfrm>
-      </p:grpSpPr>
-      <p:sp>
-        <p:nvSpPr>
-          <p:cNvPr id="2" name="Title 1">
-            <a:extLst>
-              <a:ext uri="{FF2B5EF4-FFF2-40B4-BE49-F238E27FC236}">
-                <a16:creationId xmlns:a16="http://schemas.microsoft.com/office/drawing/2014/main" id="{1CC5D32F-7C18-4D00-8D54-2FB046F0A206}"/>
-              </a:ext>
-            </a:extLst>
-          </p:cNvPr>
-          <p:cNvSpPr>
-            <a:spLocks noGrp="1"/>
-          </p:cNvSpPr>
-          <p:nvPr>
-            <p:ph type="title"/>
-          </p:nvPr>
-        </p:nvSpPr>
-        <p:spPr>
-          <a:xfrm>
-            <a:off x="838200" y="518160"/>
-            <a:ext cx="10515600" cy="562928"/>
-          </a:xfrm>
-        </p:spPr>
-        <p:txBody>
-          <a:bodyPr>
-            <a:normAutofit fontScale="90000"/>
-          </a:bodyPr>
-          <a:lstStyle/>
-          <a:p>
-            <a:r>
-              <a:rPr lang="en-NZ" dirty="0"/>
-              <a:t>[Component name]: Testing </a:t>
-            </a:r>
-          </a:p>
-        </p:txBody>
-      </p:sp>
-      <p:sp>
-        <p:nvSpPr>
-          <p:cNvPr id="4" name="TextBox 3">
-            <a:extLst>
-              <a:ext uri="{FF2B5EF4-FFF2-40B4-BE49-F238E27FC236}">
-                <a16:creationId xmlns:a16="http://schemas.microsoft.com/office/drawing/2014/main" id="{8CD07A82-A944-4A9B-9A52-515DAC30878A}"/>
-              </a:ext>
-            </a:extLst>
-          </p:cNvPr>
-          <p:cNvSpPr txBox="1"/>
-          <p:nvPr/>
-        </p:nvSpPr>
-        <p:spPr>
-          <a:xfrm>
-            <a:off x="749300" y="1081088"/>
-            <a:ext cx="10693400" cy="646331"/>
-          </a:xfrm>
-          <a:prstGeom prst="rect">
-            <a:avLst/>
-          </a:prstGeom>
-          <a:noFill/>
-        </p:spPr>
-        <p:txBody>
-          <a:bodyPr wrap="square">
-            <a:spAutoFit/>
-          </a:bodyPr>
-          <a:lstStyle/>
-          <a:p>
-            <a:r>
-              <a:rPr lang="en-NZ" i="1" dirty="0"/>
-              <a:t>You must show the results of testing. For each component, include a screenshot proving it works.  You can also include notes about each test. </a:t>
-            </a:r>
-          </a:p>
-        </p:txBody>
-      </p:sp>
-    </p:spTree>
-    <p:extLst>
-      <p:ext uri="{BB962C8B-B14F-4D97-AF65-F5344CB8AC3E}">
-        <p14:creationId xmlns:p14="http://schemas.microsoft.com/office/powerpoint/2010/main" val="89592267"/>
-      </p:ext>
-    </p:extLst>
-  </p:cSld>
-  <p:clrMapOvr>
-    <a:masterClrMapping/>
-  </p:clrMapOvr>
-</p:sld>
-</file>
-
 <file path=ppt/slides/slide9.xml><?xml version="1.0" encoding="utf-8"?>
 <p:sld xmlns:a="http://schemas.openxmlformats.org/drawingml/2006/main" xmlns:r="http://schemas.openxmlformats.org/officeDocument/2006/relationships" xmlns:p="http://schemas.openxmlformats.org/presentationml/2006/main">
   <p:cSld>
@@ -8025,19 +8364,19 @@
         </p:nvSpPr>
         <p:spPr>
           <a:xfrm>
-            <a:off x="749300" y="223520"/>
-            <a:ext cx="10515600" cy="806768"/>
+            <a:off x="838200" y="518160"/>
+            <a:ext cx="10515600" cy="562928"/>
           </a:xfrm>
         </p:spPr>
         <p:txBody>
           <a:bodyPr>
-            <a:normAutofit/>
+            <a:normAutofit fontScale="90000"/>
           </a:bodyPr>
           <a:lstStyle/>
           <a:p>
             <a:r>
-              <a:rPr lang="en-NZ" sz="4000" dirty="0"/>
-              <a:t>[Component name]: Trialling </a:t>
+              <a:rPr lang="en-NZ" dirty="0"/>
+              <a:t>[Component name]: Testing </a:t>
             </a:r>
           </a:p>
         </p:txBody>
@@ -8056,8 +8395,8 @@
         </p:nvSpPr>
         <p:spPr>
           <a:xfrm>
-            <a:off x="660400" y="1030288"/>
-            <a:ext cx="10693400" cy="923330"/>
+            <a:off x="749300" y="1081088"/>
+            <a:ext cx="10693400" cy="646331"/>
           </a:xfrm>
           <a:prstGeom prst="rect">
             <a:avLst/>
@@ -8072,30 +8411,15 @@
           <a:p>
             <a:r>
               <a:rPr lang="en-NZ" i="1" dirty="0"/>
-              <a:t>NOTE: Trialling needs to happen for </a:t>
-            </a:r>
-            <a:r>
-              <a:rPr lang="en-NZ" b="1" i="1" dirty="0"/>
-              <a:t>at least 2 </a:t>
-            </a:r>
-            <a:r>
-              <a:rPr lang="en-NZ" i="1" dirty="0"/>
-              <a:t>of your components but is not necessary for ALL components.</a:t>
-            </a:r>
-          </a:p>
-          <a:p>
-            <a:r>
-              <a:rPr lang="en" i="1" dirty="0"/>
-              <a:t>Trialling is not the same as testing. Trialling is about finding different ways of building the same component. Show evidence of  your trialling  here. Select one of your trials for further development and give reasons for your choice. </a:t>
-            </a:r>
-            <a:endParaRPr lang="en-NZ" dirty="0"/>
+              <a:t>You must show the results of testing. For each component, include a screenshot proving it works.  You can also include notes about each test. </a:t>
+            </a:r>
           </a:p>
         </p:txBody>
       </p:sp>
     </p:spTree>
     <p:extLst>
       <p:ext uri="{BB962C8B-B14F-4D97-AF65-F5344CB8AC3E}">
-        <p14:creationId xmlns:p14="http://schemas.microsoft.com/office/powerpoint/2010/main" val="270828811"/>
+        <p14:creationId xmlns:p14="http://schemas.microsoft.com/office/powerpoint/2010/main" val="89592267"/>
       </p:ext>
     </p:extLst>
   </p:cSld>
@@ -8696,6 +9020,15 @@
 </file>
 
 <file path=customXml/item1.xml><?xml version="1.0" encoding="utf-8"?>
+<?mso-contentType ?>
+<FormTemplates xmlns="http://schemas.microsoft.com/sharepoint/v3/contenttype/forms">
+  <Display>DocumentLibraryForm</Display>
+  <Edit>DocumentLibraryForm</Edit>
+  <New>DocumentLibraryForm</New>
+</FormTemplates>
+</file>
+
+<file path=customXml/item2.xml><?xml version="1.0" encoding="utf-8"?>
 <ct:contentTypeSchema xmlns:ct="http://schemas.microsoft.com/office/2006/metadata/contentType" xmlns:ma="http://schemas.microsoft.com/office/2006/metadata/properties/metaAttributes" ct:_="" ma:_="" ma:contentTypeName="Document" ma:contentTypeID="0x010100B37AA4149E3FCE42B2F0D36F55263BE7" ma:contentTypeVersion="3" ma:contentTypeDescription="Create a new document." ma:contentTypeScope="" ma:versionID="f7f1c092f231b6630c24ec1f654af881">
   <xsd:schema xmlns:xsd="http://www.w3.org/2001/XMLSchema" xmlns:xs="http://www.w3.org/2001/XMLSchema" xmlns:p="http://schemas.microsoft.com/office/2006/metadata/properties" xmlns:ns2="205ad105-7c38-4030-89bf-bb8828f957ce" targetNamespace="http://schemas.microsoft.com/office/2006/metadata/properties" ma:root="true" ma:fieldsID="4b98ef4347ca2c9d6ddeb86b863b8840" ns2:_="">
     <xsd:import namespace="205ad105-7c38-4030-89bf-bb8828f957ce"/>
@@ -8833,16 +9166,15 @@
 </ct:contentTypeSchema>
 </file>
 
-<file path=customXml/item2.xml><?xml version="1.0" encoding="utf-8"?>
-<?mso-contentType ?>
-<FormTemplates xmlns="http://schemas.microsoft.com/sharepoint/v3/contenttype/forms">
-  <Display>DocumentLibraryForm</Display>
-  <Edit>DocumentLibraryForm</Edit>
-  <New>DocumentLibraryForm</New>
-</FormTemplates>
+<file path=customXml/itemProps1.xml><?xml version="1.0" encoding="utf-8"?>
+<ds:datastoreItem xmlns:ds="http://schemas.openxmlformats.org/officeDocument/2006/customXml" ds:itemID="{2025CDDF-CD31-423A-BEB8-DE00B73966BF}">
+  <ds:schemaRefs>
+    <ds:schemaRef ds:uri="http://schemas.microsoft.com/sharepoint/v3/contenttype/forms"/>
+  </ds:schemaRefs>
+</ds:datastoreItem>
 </file>
 
-<file path=customXml/itemProps1.xml><?xml version="1.0" encoding="utf-8"?>
+<file path=customXml/itemProps2.xml><?xml version="1.0" encoding="utf-8"?>
 <ds:datastoreItem xmlns:ds="http://schemas.openxmlformats.org/officeDocument/2006/customXml" ds:itemID="{F118AE1B-89AB-4E8D-A474-F3B1187AE7D6}">
   <ds:schemaRefs>
     <ds:schemaRef ds:uri="http://schemas.microsoft.com/office/2006/metadata/contentType"/>
@@ -8858,12 +9190,4 @@
     <ds:schemaRef ds:uri="http://schemas.microsoft.com/internal/obd"/>
   </ds:schemaRefs>
 </ds:datastoreItem>
-</file>
-
-<file path=customXml/itemProps2.xml><?xml version="1.0" encoding="utf-8"?>
-<ds:datastoreItem xmlns:ds="http://schemas.openxmlformats.org/officeDocument/2006/customXml" ds:itemID="{2025CDDF-CD31-423A-BEB8-DE00B73966BF}">
-  <ds:schemaRefs>
-    <ds:schemaRef ds:uri="http://schemas.microsoft.com/sharepoint/v3/contenttype/forms"/>
-  </ds:schemaRefs>
-</ds:datastoreItem>
 </file>
</xml_diff>